<commit_message>
added link to repo, email, pdfs
</commit_message>
<xml_diff>
--- a/amatoGit.pptx
+++ b/amatoGit.pptx
@@ -141,6 +141,11 @@
       </a:defRPr>
     </a:lvl9pPr>
   </p:defaultTextStyle>
+  <p:extLst>
+    <p:ext uri="{EFAFB233-063F-42B5-8137-9DF3F51BA10A}">
+      <p15:sldGuideLst xmlns:p15="http://schemas.microsoft.com/office/powerpoint/2012/main"/>
+    </p:ext>
+  </p:extLst>
 </p:presentation>
 </file>
 
@@ -19801,7 +19806,7 @@
           <a:p>
             <a:fld id="{EA0C0817-A112-4847-8014-A94B7D2A4EA3}" type="datetime1">
               <a:rPr lang="en-US" smtClean="0"/>
-              <a:t>3/10/20</a:t>
+              <a:t>3/12/20</a:t>
             </a:fld>
             <a:endParaRPr lang="en-US" dirty="0"/>
           </a:p>
@@ -20003,7 +20008,7 @@
           <a:p>
             <a:fld id="{134F40B7-36AB-4376-BE14-EF7004D79BB9}" type="datetime1">
               <a:rPr lang="en-US" smtClean="0"/>
-              <a:t>3/10/20</a:t>
+              <a:t>3/12/20</a:t>
             </a:fld>
             <a:endParaRPr lang="en-US"/>
           </a:p>
@@ -20183,7 +20188,7 @@
           <a:p>
             <a:fld id="{FF87CAB8-DCAE-46A5-AADA-B3FAD11A54E0}" type="datetime1">
               <a:rPr lang="en-US" smtClean="0"/>
-              <a:t>3/10/20</a:t>
+              <a:t>3/12/20</a:t>
             </a:fld>
             <a:endParaRPr lang="en-US"/>
           </a:p>
@@ -20353,7 +20358,7 @@
           <a:p>
             <a:fld id="{7332B432-ACDA-4023-A761-2BAB76577B62}" type="datetime1">
               <a:rPr lang="en-US" smtClean="0"/>
-              <a:t>3/10/20</a:t>
+              <a:t>3/12/20</a:t>
             </a:fld>
             <a:endParaRPr lang="en-US"/>
           </a:p>
@@ -20952,7 +20957,7 @@
           <a:p>
             <a:fld id="{D9C646AA-F36E-4540-911D-FFFC0A0EF24A}" type="datetime1">
               <a:rPr lang="en-US" smtClean="0"/>
-              <a:t>3/10/20</a:t>
+              <a:t>3/12/20</a:t>
             </a:fld>
             <a:endParaRPr lang="en-US" dirty="0"/>
           </a:p>
@@ -21272,7 +21277,7 @@
           <a:p>
             <a:fld id="{69186D26-FA5F-4637-B602-B7C2DC34CFD4}" type="datetime1">
               <a:rPr lang="en-US" smtClean="0"/>
-              <a:t>3/10/20</a:t>
+              <a:t>3/12/20</a:t>
             </a:fld>
             <a:endParaRPr lang="en-US"/>
           </a:p>
@@ -21707,7 +21712,7 @@
           <a:p>
             <a:fld id="{8A7F15D8-96D1-4781-BC50-CA8A088B2FE4}" type="datetime1">
               <a:rPr lang="en-US" smtClean="0"/>
-              <a:t>3/10/20</a:t>
+              <a:t>3/12/20</a:t>
             </a:fld>
             <a:endParaRPr lang="en-US"/>
           </a:p>
@@ -21825,7 +21830,7 @@
           <a:p>
             <a:fld id="{F9A96C99-B8F8-4528-BD05-0E16E943DC09}" type="datetime1">
               <a:rPr lang="en-US" smtClean="0"/>
-              <a:t>3/10/20</a:t>
+              <a:t>3/12/20</a:t>
             </a:fld>
             <a:endParaRPr lang="en-US"/>
           </a:p>
@@ -21920,7 +21925,7 @@
           <a:p>
             <a:fld id="{03636942-C211-4B28-8DBD-C953E00AF71B}" type="datetime1">
               <a:rPr lang="en-US" smtClean="0"/>
-              <a:t>3/10/20</a:t>
+              <a:t>3/12/20</a:t>
             </a:fld>
             <a:endParaRPr lang="en-US"/>
           </a:p>
@@ -22337,7 +22342,7 @@
           <a:p>
             <a:fld id="{7E8D12A6-918A-48BD-8CB9-CA713993B0EA}" type="datetime1">
               <a:rPr lang="en-US" smtClean="0"/>
-              <a:t>3/10/20</a:t>
+              <a:t>3/12/20</a:t>
             </a:fld>
             <a:endParaRPr lang="en-US"/>
           </a:p>
@@ -22599,7 +22604,7 @@
             <a:fld id="{E778CE86-875F-4587-BCF6-FA054AFC0D53}" type="datetime1">
               <a:rPr lang="en-US" smtClean="0"/>
               <a:pPr/>
-              <a:t>3/10/20</a:t>
+              <a:t>3/12/20</a:t>
             </a:fld>
             <a:endParaRPr lang="en-US" dirty="0"/>
           </a:p>
@@ -23118,7 +23123,7 @@
           <a:p>
             <a:fld id="{F6FA2B21-3FCD-4721-B95C-427943F61125}" type="datetime1">
               <a:rPr lang="en-US" smtClean="0"/>
-              <a:t>3/10/20</a:t>
+              <a:t>3/12/20</a:t>
             </a:fld>
             <a:endParaRPr lang="en-US"/>
           </a:p>
@@ -23749,6 +23754,21 @@
               <a:t>NUIT Research Computing Services</a:t>
             </a:r>
           </a:p>
+          <a:p>
+            <a:pPr algn="r">
+              <a:spcAft>
+                <a:spcPts val="600"/>
+              </a:spcAft>
+            </a:pPr>
+            <a:r>
+              <a:rPr lang="en-US" dirty="0">
+                <a:solidFill>
+                  <a:schemeClr val="bg1"/>
+                </a:solidFill>
+              </a:rPr>
+              <a:t>colby.witherup@gmail.com</a:t>
+            </a:r>
+          </a:p>
         </p:txBody>
       </p:sp>
       <p:sp>
@@ -35891,6 +35911,14 @@
 <file path=ppt/slides/slide3.xml><?xml version="1.0" encoding="utf-8"?>
 <p:sld xmlns:a="http://schemas.openxmlformats.org/drawingml/2006/main" xmlns:r="http://schemas.openxmlformats.org/officeDocument/2006/relationships" xmlns:p="http://schemas.openxmlformats.org/presentationml/2006/main">
   <p:cSld>
+    <p:bg>
+      <p:bgPr>
+        <a:solidFill>
+          <a:schemeClr val="bg1"/>
+        </a:solidFill>
+        <a:effectLst/>
+      </p:bgPr>
+    </p:bg>
     <p:spTree>
       <p:nvGrpSpPr>
         <p:cNvPr id="1" name=""/>
@@ -35907,6 +35935,208 @@
       </p:grpSpPr>
       <p:sp>
         <p:nvSpPr>
+          <p:cNvPr id="8" name="Rectangle 7">
+            <a:extLst>
+              <a:ext uri="{FF2B5EF4-FFF2-40B4-BE49-F238E27FC236}">
+                <a16:creationId xmlns:a16="http://schemas.microsoft.com/office/drawing/2014/main" id="{70120F84-A866-4D9F-8B1C-9120A013D654}"/>
+              </a:ext>
+              <a:ext uri="{C183D7F6-B498-43B3-948B-1728B52AA6E4}">
+                <adec:decorative xmlns:adec="http://schemas.microsoft.com/office/drawing/2017/decorative" val="1"/>
+              </a:ext>
+            </a:extLst>
+          </p:cNvPr>
+          <p:cNvSpPr>
+            <a:spLocks noGrp="1" noRot="1" noChangeAspect="1" noMove="1" noResize="1" noEditPoints="1" noAdjustHandles="1" noChangeArrowheads="1" noChangeShapeType="1" noTextEdit="1"/>
+          </p:cNvSpPr>
+          <p:nvPr>
+            <p:extLst>
+              <p:ext uri="{386F3935-93C4-4BCD-93E2-E3B085C9AB24}">
+                <p16:designElem xmlns:p16="http://schemas.microsoft.com/office/powerpoint/2015/main" val="1"/>
+              </p:ext>
+            </p:extLst>
+          </p:nvPr>
+        </p:nvSpPr>
+        <p:spPr>
+          <a:xfrm>
+            <a:off x="0" y="0"/>
+            <a:ext cx="12192001" cy="6858000"/>
+          </a:xfrm>
+          <a:prstGeom prst="rect">
+            <a:avLst/>
+          </a:prstGeom>
+          <a:solidFill>
+            <a:schemeClr val="accent1"/>
+          </a:solidFill>
+          <a:ln>
+            <a:noFill/>
+          </a:ln>
+        </p:spPr>
+        <p:style>
+          <a:lnRef idx="2">
+            <a:schemeClr val="accent1">
+              <a:shade val="50000"/>
+            </a:schemeClr>
+          </a:lnRef>
+          <a:fillRef idx="1">
+            <a:schemeClr val="accent1"/>
+          </a:fillRef>
+          <a:effectRef idx="0">
+            <a:schemeClr val="accent1"/>
+          </a:effectRef>
+          <a:fontRef idx="minor">
+            <a:schemeClr val="lt1"/>
+          </a:fontRef>
+        </p:style>
+        <p:txBody>
+          <a:bodyPr rot="0" spcFirstLastPara="0" vert="horz" wrap="square" lIns="91440" tIns="45720" rIns="91440" bIns="45720" numCol="1" spcCol="0" rtlCol="0" fromWordArt="0" anchor="ctr" anchorCtr="0" forceAA="0" compatLnSpc="1">
+            <a:prstTxWarp prst="textNoShape">
+              <a:avLst/>
+            </a:prstTxWarp>
+            <a:noAutofit/>
+          </a:bodyPr>
+          <a:lstStyle>
+            <a:defPPr>
+              <a:defRPr lang="en-US"/>
+            </a:defPPr>
+            <a:lvl1pPr marL="0" algn="l" defTabSz="914400" rtl="0" eaLnBrk="1" latinLnBrk="0" hangingPunct="1">
+              <a:defRPr sz="1800" kern="1200">
+                <a:solidFill>
+                  <a:schemeClr val="lt1"/>
+                </a:solidFill>
+                <a:latin typeface="+mn-lt"/>
+                <a:ea typeface="+mn-ea"/>
+                <a:cs typeface="+mn-cs"/>
+              </a:defRPr>
+            </a:lvl1pPr>
+            <a:lvl2pPr marL="457200" algn="l" defTabSz="914400" rtl="0" eaLnBrk="1" latinLnBrk="0" hangingPunct="1">
+              <a:defRPr sz="1800" kern="1200">
+                <a:solidFill>
+                  <a:schemeClr val="lt1"/>
+                </a:solidFill>
+                <a:latin typeface="+mn-lt"/>
+                <a:ea typeface="+mn-ea"/>
+                <a:cs typeface="+mn-cs"/>
+              </a:defRPr>
+            </a:lvl2pPr>
+            <a:lvl3pPr marL="914400" algn="l" defTabSz="914400" rtl="0" eaLnBrk="1" latinLnBrk="0" hangingPunct="1">
+              <a:defRPr sz="1800" kern="1200">
+                <a:solidFill>
+                  <a:schemeClr val="lt1"/>
+                </a:solidFill>
+                <a:latin typeface="+mn-lt"/>
+                <a:ea typeface="+mn-ea"/>
+                <a:cs typeface="+mn-cs"/>
+              </a:defRPr>
+            </a:lvl3pPr>
+            <a:lvl4pPr marL="1371600" algn="l" defTabSz="914400" rtl="0" eaLnBrk="1" latinLnBrk="0" hangingPunct="1">
+              <a:defRPr sz="1800" kern="1200">
+                <a:solidFill>
+                  <a:schemeClr val="lt1"/>
+                </a:solidFill>
+                <a:latin typeface="+mn-lt"/>
+                <a:ea typeface="+mn-ea"/>
+                <a:cs typeface="+mn-cs"/>
+              </a:defRPr>
+            </a:lvl4pPr>
+            <a:lvl5pPr marL="1828800" algn="l" defTabSz="914400" rtl="0" eaLnBrk="1" latinLnBrk="0" hangingPunct="1">
+              <a:defRPr sz="1800" kern="1200">
+                <a:solidFill>
+                  <a:schemeClr val="lt1"/>
+                </a:solidFill>
+                <a:latin typeface="+mn-lt"/>
+                <a:ea typeface="+mn-ea"/>
+                <a:cs typeface="+mn-cs"/>
+              </a:defRPr>
+            </a:lvl5pPr>
+            <a:lvl6pPr marL="2286000" algn="l" defTabSz="914400" rtl="0" eaLnBrk="1" latinLnBrk="0" hangingPunct="1">
+              <a:defRPr sz="1800" kern="1200">
+                <a:solidFill>
+                  <a:schemeClr val="lt1"/>
+                </a:solidFill>
+                <a:latin typeface="+mn-lt"/>
+                <a:ea typeface="+mn-ea"/>
+                <a:cs typeface="+mn-cs"/>
+              </a:defRPr>
+            </a:lvl6pPr>
+            <a:lvl7pPr marL="2743200" algn="l" defTabSz="914400" rtl="0" eaLnBrk="1" latinLnBrk="0" hangingPunct="1">
+              <a:defRPr sz="1800" kern="1200">
+                <a:solidFill>
+                  <a:schemeClr val="lt1"/>
+                </a:solidFill>
+                <a:latin typeface="+mn-lt"/>
+                <a:ea typeface="+mn-ea"/>
+                <a:cs typeface="+mn-cs"/>
+              </a:defRPr>
+            </a:lvl7pPr>
+            <a:lvl8pPr marL="3200400" algn="l" defTabSz="914400" rtl="0" eaLnBrk="1" latinLnBrk="0" hangingPunct="1">
+              <a:defRPr sz="1800" kern="1200">
+                <a:solidFill>
+                  <a:schemeClr val="lt1"/>
+                </a:solidFill>
+                <a:latin typeface="+mn-lt"/>
+                <a:ea typeface="+mn-ea"/>
+                <a:cs typeface="+mn-cs"/>
+              </a:defRPr>
+            </a:lvl8pPr>
+            <a:lvl9pPr marL="3657600" algn="l" defTabSz="914400" rtl="0" eaLnBrk="1" latinLnBrk="0" hangingPunct="1">
+              <a:defRPr sz="1800" kern="1200">
+                <a:solidFill>
+                  <a:schemeClr val="lt1"/>
+                </a:solidFill>
+                <a:latin typeface="+mn-lt"/>
+                <a:ea typeface="+mn-ea"/>
+                <a:cs typeface="+mn-cs"/>
+              </a:defRPr>
+            </a:lvl9pPr>
+          </a:lstStyle>
+          <a:p>
+            <a:pPr algn="ctr"/>
+            <a:endParaRPr lang="en-US"/>
+          </a:p>
+        </p:txBody>
+      </p:sp>
+      <p:sp useBgFill="1">
+        <p:nvSpPr>
+          <p:cNvPr id="10" name="Rectangle 9">
+            <a:extLst>
+              <a:ext uri="{FF2B5EF4-FFF2-40B4-BE49-F238E27FC236}">
+                <a16:creationId xmlns:a16="http://schemas.microsoft.com/office/drawing/2014/main" id="{252FEFEF-6AC0-46B6-AC09-11FC56196FA4}"/>
+              </a:ext>
+              <a:ext uri="{C183D7F6-B498-43B3-948B-1728B52AA6E4}">
+                <adec:decorative xmlns:adec="http://schemas.microsoft.com/office/drawing/2017/decorative" val="1"/>
+              </a:ext>
+            </a:extLst>
+          </p:cNvPr>
+          <p:cNvSpPr>
+            <a:spLocks noGrp="1" noRot="1" noChangeAspect="1" noMove="1" noResize="1" noEditPoints="1" noAdjustHandles="1" noChangeArrowheads="1" noChangeShapeType="1" noTextEdit="1"/>
+          </p:cNvSpPr>
+          <p:nvPr>
+            <p:extLst>
+              <p:ext uri="{386F3935-93C4-4BCD-93E2-E3B085C9AB24}">
+                <p16:designElem xmlns:p16="http://schemas.microsoft.com/office/powerpoint/2015/main" val="1"/>
+              </p:ext>
+            </p:extLst>
+          </p:nvPr>
+        </p:nvSpPr>
+        <p:spPr>
+          <a:xfrm>
+            <a:off x="210312" y="226665"/>
+            <a:ext cx="11722608" cy="6382512"/>
+          </a:xfrm>
+          <a:prstGeom prst="rect">
+            <a:avLst/>
+          </a:prstGeom>
+          <a:ln w="6350" cap="flat" cmpd="sng" algn="ctr">
+            <a:noFill/>
+            <a:prstDash val="solid"/>
+          </a:ln>
+          <a:effectLst>
+            <a:softEdge rad="0"/>
+          </a:effectLst>
+        </p:spPr>
+      </p:sp>
+      <p:sp>
+        <p:nvSpPr>
           <p:cNvPr id="2" name="Title 1">
             <a:extLst>
               <a:ext uri="{FF2B5EF4-FFF2-40B4-BE49-F238E27FC236}">
@@ -35921,9 +36151,16 @@
             <p:ph type="title"/>
           </p:nvPr>
         </p:nvSpPr>
-        <p:spPr/>
+        <p:spPr>
+          <a:xfrm>
+            <a:off x="1175512" y="870132"/>
+            <a:ext cx="9792208" cy="1527078"/>
+          </a:xfrm>
+        </p:spPr>
         <p:txBody>
-          <a:bodyPr/>
+          <a:bodyPr>
+            <a:normAutofit/>
+          </a:bodyPr>
           <a:lstStyle/>
           <a:p>
             <a:r>
@@ -35949,56 +36186,63 @@
             <p:ph idx="1"/>
           </p:nvPr>
         </p:nvSpPr>
-        <p:spPr/>
+        <p:spPr>
+          <a:xfrm>
+            <a:off x="1175512" y="2557849"/>
+            <a:ext cx="9792208" cy="3407862"/>
+          </a:xfrm>
+        </p:spPr>
         <p:txBody>
-          <a:bodyPr/>
+          <a:bodyPr>
+            <a:normAutofit/>
+          </a:bodyPr>
           <a:lstStyle/>
           <a:p>
             <a:r>
-              <a:rPr lang="en-US" dirty="0"/>
-              <a:t>Before Friday, please do the following:</a:t>
-            </a:r>
-          </a:p>
-          <a:p>
-            <a:r>
-              <a:rPr lang="en-US" dirty="0"/>
+              <a:rPr lang="en-US" sz="2400" dirty="0"/>
               <a:t>Install Git: </a:t>
             </a:r>
             <a:r>
-              <a:rPr lang="en-US" u="sng" dirty="0">
+              <a:rPr lang="en-US" sz="2400" u="sng" dirty="0">
                 <a:hlinkClick r:id="rId2" tooltip="https://git-scm.com/downloads"/>
               </a:rPr>
               <a:t>https://git-scm.com/downloads</a:t>
             </a:r>
             <a:r>
-              <a:rPr lang="en-US" dirty="0"/>
+              <a:rPr lang="en-US" sz="2400" dirty="0"/>
               <a:t>. Select the Mac, Windows, or Linux/Unix download. We will not be using the GUI.</a:t>
             </a:r>
           </a:p>
           <a:p>
             <a:r>
-              <a:rPr lang="en-US" dirty="0"/>
+              <a:rPr lang="en-US" sz="2400" dirty="0"/>
               <a:t>Create a GitHub account if you do not already have one: </a:t>
             </a:r>
             <a:r>
-              <a:rPr lang="en-US" u="sng" dirty="0">
+              <a:rPr lang="en-US" sz="2400" u="sng" dirty="0">
                 <a:hlinkClick r:id="rId3"/>
               </a:rPr>
               <a:t>https://github.com/join</a:t>
             </a:r>
             <a:r>
-              <a:rPr lang="en-US" dirty="0"/>
+              <a:rPr lang="en-US" sz="2400" dirty="0"/>
               <a:t>.</a:t>
             </a:r>
           </a:p>
           <a:p>
             <a:r>
-              <a:rPr lang="en-US" dirty="0"/>
-              <a:t>This tutorial can be </a:t>
+              <a:rPr lang="en-US" sz="2400" dirty="0"/>
+              <a:t>These slides can be downloaded from: </a:t>
             </a:r>
             <a:r>
-              <a:rPr lang="en-US"/>
-              <a:t>downloaded from: </a:t>
+              <a:rPr lang="en-US" sz="2400" dirty="0">
+                <a:hlinkClick r:id="rId4"/>
+              </a:rPr>
+              <a:t>https://github.com/aGitHasNoName/amatoLab</a:t>
+            </a:r>
+            <a:r>
+              <a:rPr lang="en-US" sz="2400" dirty="0"/>
+              <a:t>. Click the green button that says Clone or download, and then Download ZIP.</a:t>
             </a:r>
           </a:p>
         </p:txBody>

</xml_diff>

<commit_message>
added code for lesson 2
</commit_message>
<xml_diff>
--- a/amatoGit.pptx
+++ b/amatoGit.pptx
@@ -43,6 +43,7 @@
     <p:sldId id="287" r:id="rId37"/>
     <p:sldId id="288" r:id="rId38"/>
     <p:sldId id="289" r:id="rId39"/>
+    <p:sldId id="295" r:id="rId40"/>
   </p:sldIdLst>
   <p:sldSz cx="12192000" cy="6858000"/>
   <p:notesSz cx="6858000" cy="9144000"/>
@@ -19806,7 +19807,7 @@
           <a:p>
             <a:fld id="{EA0C0817-A112-4847-8014-A94B7D2A4EA3}" type="datetime1">
               <a:rPr lang="en-US" smtClean="0"/>
-              <a:t>3/12/20</a:t>
+              <a:t>3/13/20</a:t>
             </a:fld>
             <a:endParaRPr lang="en-US" dirty="0"/>
           </a:p>
@@ -20008,7 +20009,7 @@
           <a:p>
             <a:fld id="{134F40B7-36AB-4376-BE14-EF7004D79BB9}" type="datetime1">
               <a:rPr lang="en-US" smtClean="0"/>
-              <a:t>3/12/20</a:t>
+              <a:t>3/13/20</a:t>
             </a:fld>
             <a:endParaRPr lang="en-US"/>
           </a:p>
@@ -20188,7 +20189,7 @@
           <a:p>
             <a:fld id="{FF87CAB8-DCAE-46A5-AADA-B3FAD11A54E0}" type="datetime1">
               <a:rPr lang="en-US" smtClean="0"/>
-              <a:t>3/12/20</a:t>
+              <a:t>3/13/20</a:t>
             </a:fld>
             <a:endParaRPr lang="en-US"/>
           </a:p>
@@ -20358,7 +20359,7 @@
           <a:p>
             <a:fld id="{7332B432-ACDA-4023-A761-2BAB76577B62}" type="datetime1">
               <a:rPr lang="en-US" smtClean="0"/>
-              <a:t>3/12/20</a:t>
+              <a:t>3/13/20</a:t>
             </a:fld>
             <a:endParaRPr lang="en-US"/>
           </a:p>
@@ -20957,7 +20958,7 @@
           <a:p>
             <a:fld id="{D9C646AA-F36E-4540-911D-FFFC0A0EF24A}" type="datetime1">
               <a:rPr lang="en-US" smtClean="0"/>
-              <a:t>3/12/20</a:t>
+              <a:t>3/13/20</a:t>
             </a:fld>
             <a:endParaRPr lang="en-US" dirty="0"/>
           </a:p>
@@ -21277,7 +21278,7 @@
           <a:p>
             <a:fld id="{69186D26-FA5F-4637-B602-B7C2DC34CFD4}" type="datetime1">
               <a:rPr lang="en-US" smtClean="0"/>
-              <a:t>3/12/20</a:t>
+              <a:t>3/13/20</a:t>
             </a:fld>
             <a:endParaRPr lang="en-US"/>
           </a:p>
@@ -21712,7 +21713,7 @@
           <a:p>
             <a:fld id="{8A7F15D8-96D1-4781-BC50-CA8A088B2FE4}" type="datetime1">
               <a:rPr lang="en-US" smtClean="0"/>
-              <a:t>3/12/20</a:t>
+              <a:t>3/13/20</a:t>
             </a:fld>
             <a:endParaRPr lang="en-US"/>
           </a:p>
@@ -21830,7 +21831,7 @@
           <a:p>
             <a:fld id="{F9A96C99-B8F8-4528-BD05-0E16E943DC09}" type="datetime1">
               <a:rPr lang="en-US" smtClean="0"/>
-              <a:t>3/12/20</a:t>
+              <a:t>3/13/20</a:t>
             </a:fld>
             <a:endParaRPr lang="en-US"/>
           </a:p>
@@ -21925,7 +21926,7 @@
           <a:p>
             <a:fld id="{03636942-C211-4B28-8DBD-C953E00AF71B}" type="datetime1">
               <a:rPr lang="en-US" smtClean="0"/>
-              <a:t>3/12/20</a:t>
+              <a:t>3/13/20</a:t>
             </a:fld>
             <a:endParaRPr lang="en-US"/>
           </a:p>
@@ -22342,7 +22343,7 @@
           <a:p>
             <a:fld id="{7E8D12A6-918A-48BD-8CB9-CA713993B0EA}" type="datetime1">
               <a:rPr lang="en-US" smtClean="0"/>
-              <a:t>3/12/20</a:t>
+              <a:t>3/13/20</a:t>
             </a:fld>
             <a:endParaRPr lang="en-US"/>
           </a:p>
@@ -22604,7 +22605,7 @@
             <a:fld id="{E778CE86-875F-4587-BCF6-FA054AFC0D53}" type="datetime1">
               <a:rPr lang="en-US" smtClean="0"/>
               <a:pPr/>
-              <a:t>3/12/20</a:t>
+              <a:t>3/13/20</a:t>
             </a:fld>
             <a:endParaRPr lang="en-US" dirty="0"/>
           </a:p>
@@ -23123,7 +23124,7 @@
           <a:p>
             <a:fld id="{F6FA2B21-3FCD-4721-B95C-427943F61125}" type="datetime1">
               <a:rPr lang="en-US" smtClean="0"/>
-              <a:t>3/12/20</a:t>
+              <a:t>3/13/20</a:t>
             </a:fld>
             <a:endParaRPr lang="en-US"/>
           </a:p>
@@ -39687,6 +39688,1212 @@
 </p:sld>
 </file>
 
+<file path=ppt/slides/slide39.xml><?xml version="1.0" encoding="utf-8"?>
+<p:sld xmlns:a="http://schemas.openxmlformats.org/drawingml/2006/main" xmlns:r="http://schemas.openxmlformats.org/officeDocument/2006/relationships" xmlns:p="http://schemas.openxmlformats.org/presentationml/2006/main">
+  <p:cSld>
+    <p:bg>
+      <p:bgPr>
+        <a:solidFill>
+          <a:schemeClr val="bg1"/>
+        </a:solidFill>
+        <a:effectLst/>
+      </p:bgPr>
+    </p:bg>
+    <p:spTree>
+      <p:nvGrpSpPr>
+        <p:cNvPr id="1" name=""/>
+        <p:cNvGrpSpPr/>
+        <p:nvPr/>
+      </p:nvGrpSpPr>
+      <p:grpSpPr>
+        <a:xfrm>
+          <a:off x="0" y="0"/>
+          <a:ext cx="0" cy="0"/>
+          <a:chOff x="0" y="0"/>
+          <a:chExt cx="0" cy="0"/>
+        </a:xfrm>
+      </p:grpSpPr>
+      <p:sp>
+        <p:nvSpPr>
+          <p:cNvPr id="9" name="Rectangle 8">
+            <a:extLst>
+              <a:ext uri="{FF2B5EF4-FFF2-40B4-BE49-F238E27FC236}">
+                <a16:creationId xmlns:a16="http://schemas.microsoft.com/office/drawing/2014/main" id="{70120F84-A866-4D9F-8B1C-9120A013D654}"/>
+              </a:ext>
+              <a:ext uri="{C183D7F6-B498-43B3-948B-1728B52AA6E4}">
+                <adec:decorative xmlns:adec="http://schemas.microsoft.com/office/drawing/2017/decorative" val="1"/>
+              </a:ext>
+            </a:extLst>
+          </p:cNvPr>
+          <p:cNvSpPr>
+            <a:spLocks noGrp="1" noRot="1" noChangeAspect="1" noMove="1" noResize="1" noEditPoints="1" noAdjustHandles="1" noChangeArrowheads="1" noChangeShapeType="1" noTextEdit="1"/>
+          </p:cNvSpPr>
+          <p:nvPr>
+            <p:extLst>
+              <p:ext uri="{386F3935-93C4-4BCD-93E2-E3B085C9AB24}">
+                <p16:designElem xmlns:p16="http://schemas.microsoft.com/office/powerpoint/2015/main" val="1"/>
+              </p:ext>
+            </p:extLst>
+          </p:nvPr>
+        </p:nvSpPr>
+        <p:spPr>
+          <a:xfrm>
+            <a:off x="0" y="0"/>
+            <a:ext cx="12192001" cy="6858000"/>
+          </a:xfrm>
+          <a:prstGeom prst="rect">
+            <a:avLst/>
+          </a:prstGeom>
+          <a:solidFill>
+            <a:schemeClr val="tx1">
+              <a:lumMod val="65000"/>
+              <a:lumOff val="35000"/>
+            </a:schemeClr>
+          </a:solidFill>
+          <a:ln>
+            <a:noFill/>
+          </a:ln>
+        </p:spPr>
+        <p:style>
+          <a:lnRef idx="2">
+            <a:schemeClr val="accent1">
+              <a:shade val="50000"/>
+            </a:schemeClr>
+          </a:lnRef>
+          <a:fillRef idx="1">
+            <a:schemeClr val="accent1"/>
+          </a:fillRef>
+          <a:effectRef idx="0">
+            <a:schemeClr val="accent1"/>
+          </a:effectRef>
+          <a:fontRef idx="minor">
+            <a:schemeClr val="lt1"/>
+          </a:fontRef>
+        </p:style>
+        <p:txBody>
+          <a:bodyPr rot="0" spcFirstLastPara="0" vert="horz" wrap="square" lIns="91440" tIns="45720" rIns="91440" bIns="45720" numCol="1" spcCol="0" rtlCol="0" fromWordArt="0" anchor="ctr" anchorCtr="0" forceAA="0" compatLnSpc="1">
+            <a:prstTxWarp prst="textNoShape">
+              <a:avLst/>
+            </a:prstTxWarp>
+            <a:noAutofit/>
+          </a:bodyPr>
+          <a:lstStyle>
+            <a:defPPr>
+              <a:defRPr lang="en-US"/>
+            </a:defPPr>
+            <a:lvl1pPr marL="0" algn="l" defTabSz="914400" rtl="0" eaLnBrk="1" latinLnBrk="0" hangingPunct="1">
+              <a:defRPr sz="1800" kern="1200">
+                <a:solidFill>
+                  <a:schemeClr val="lt1"/>
+                </a:solidFill>
+                <a:latin typeface="+mn-lt"/>
+                <a:ea typeface="+mn-ea"/>
+                <a:cs typeface="+mn-cs"/>
+              </a:defRPr>
+            </a:lvl1pPr>
+            <a:lvl2pPr marL="457200" algn="l" defTabSz="914400" rtl="0" eaLnBrk="1" latinLnBrk="0" hangingPunct="1">
+              <a:defRPr sz="1800" kern="1200">
+                <a:solidFill>
+                  <a:schemeClr val="lt1"/>
+                </a:solidFill>
+                <a:latin typeface="+mn-lt"/>
+                <a:ea typeface="+mn-ea"/>
+                <a:cs typeface="+mn-cs"/>
+              </a:defRPr>
+            </a:lvl2pPr>
+            <a:lvl3pPr marL="914400" algn="l" defTabSz="914400" rtl="0" eaLnBrk="1" latinLnBrk="0" hangingPunct="1">
+              <a:defRPr sz="1800" kern="1200">
+                <a:solidFill>
+                  <a:schemeClr val="lt1"/>
+                </a:solidFill>
+                <a:latin typeface="+mn-lt"/>
+                <a:ea typeface="+mn-ea"/>
+                <a:cs typeface="+mn-cs"/>
+              </a:defRPr>
+            </a:lvl3pPr>
+            <a:lvl4pPr marL="1371600" algn="l" defTabSz="914400" rtl="0" eaLnBrk="1" latinLnBrk="0" hangingPunct="1">
+              <a:defRPr sz="1800" kern="1200">
+                <a:solidFill>
+                  <a:schemeClr val="lt1"/>
+                </a:solidFill>
+                <a:latin typeface="+mn-lt"/>
+                <a:ea typeface="+mn-ea"/>
+                <a:cs typeface="+mn-cs"/>
+              </a:defRPr>
+            </a:lvl4pPr>
+            <a:lvl5pPr marL="1828800" algn="l" defTabSz="914400" rtl="0" eaLnBrk="1" latinLnBrk="0" hangingPunct="1">
+              <a:defRPr sz="1800" kern="1200">
+                <a:solidFill>
+                  <a:schemeClr val="lt1"/>
+                </a:solidFill>
+                <a:latin typeface="+mn-lt"/>
+                <a:ea typeface="+mn-ea"/>
+                <a:cs typeface="+mn-cs"/>
+              </a:defRPr>
+            </a:lvl5pPr>
+            <a:lvl6pPr marL="2286000" algn="l" defTabSz="914400" rtl="0" eaLnBrk="1" latinLnBrk="0" hangingPunct="1">
+              <a:defRPr sz="1800" kern="1200">
+                <a:solidFill>
+                  <a:schemeClr val="lt1"/>
+                </a:solidFill>
+                <a:latin typeface="+mn-lt"/>
+                <a:ea typeface="+mn-ea"/>
+                <a:cs typeface="+mn-cs"/>
+              </a:defRPr>
+            </a:lvl6pPr>
+            <a:lvl7pPr marL="2743200" algn="l" defTabSz="914400" rtl="0" eaLnBrk="1" latinLnBrk="0" hangingPunct="1">
+              <a:defRPr sz="1800" kern="1200">
+                <a:solidFill>
+                  <a:schemeClr val="lt1"/>
+                </a:solidFill>
+                <a:latin typeface="+mn-lt"/>
+                <a:ea typeface="+mn-ea"/>
+                <a:cs typeface="+mn-cs"/>
+              </a:defRPr>
+            </a:lvl7pPr>
+            <a:lvl8pPr marL="3200400" algn="l" defTabSz="914400" rtl="0" eaLnBrk="1" latinLnBrk="0" hangingPunct="1">
+              <a:defRPr sz="1800" kern="1200">
+                <a:solidFill>
+                  <a:schemeClr val="lt1"/>
+                </a:solidFill>
+                <a:latin typeface="+mn-lt"/>
+                <a:ea typeface="+mn-ea"/>
+                <a:cs typeface="+mn-cs"/>
+              </a:defRPr>
+            </a:lvl8pPr>
+            <a:lvl9pPr marL="3657600" algn="l" defTabSz="914400" rtl="0" eaLnBrk="1" latinLnBrk="0" hangingPunct="1">
+              <a:defRPr sz="1800" kern="1200">
+                <a:solidFill>
+                  <a:schemeClr val="lt1"/>
+                </a:solidFill>
+                <a:latin typeface="+mn-lt"/>
+                <a:ea typeface="+mn-ea"/>
+                <a:cs typeface="+mn-cs"/>
+              </a:defRPr>
+            </a:lvl9pPr>
+          </a:lstStyle>
+          <a:p>
+            <a:pPr algn="ctr"/>
+            <a:endParaRPr lang="en-US"/>
+          </a:p>
+        </p:txBody>
+      </p:sp>
+      <p:sp useBgFill="1">
+        <p:nvSpPr>
+          <p:cNvPr id="11" name="Rectangle 10">
+            <a:extLst>
+              <a:ext uri="{FF2B5EF4-FFF2-40B4-BE49-F238E27FC236}">
+                <a16:creationId xmlns:a16="http://schemas.microsoft.com/office/drawing/2014/main" id="{252FEFEF-6AC0-46B6-AC09-11FC56196FA4}"/>
+              </a:ext>
+              <a:ext uri="{C183D7F6-B498-43B3-948B-1728B52AA6E4}">
+                <adec:decorative xmlns:adec="http://schemas.microsoft.com/office/drawing/2017/decorative" val="1"/>
+              </a:ext>
+            </a:extLst>
+          </p:cNvPr>
+          <p:cNvSpPr>
+            <a:spLocks noGrp="1" noRot="1" noChangeAspect="1" noMove="1" noResize="1" noEditPoints="1" noAdjustHandles="1" noChangeArrowheads="1" noChangeShapeType="1" noTextEdit="1"/>
+          </p:cNvSpPr>
+          <p:nvPr>
+            <p:extLst>
+              <p:ext uri="{386F3935-93C4-4BCD-93E2-E3B085C9AB24}">
+                <p16:designElem xmlns:p16="http://schemas.microsoft.com/office/powerpoint/2015/main" val="1"/>
+              </p:ext>
+            </p:extLst>
+          </p:nvPr>
+        </p:nvSpPr>
+        <p:spPr>
+          <a:xfrm>
+            <a:off x="210312" y="226665"/>
+            <a:ext cx="11722608" cy="6382512"/>
+          </a:xfrm>
+          <a:prstGeom prst="rect">
+            <a:avLst/>
+          </a:prstGeom>
+          <a:ln w="6350" cap="flat" cmpd="sng" algn="ctr">
+            <a:noFill/>
+            <a:prstDash val="solid"/>
+          </a:ln>
+          <a:effectLst>
+            <a:softEdge rad="0"/>
+          </a:effectLst>
+        </p:spPr>
+      </p:sp>
+      <p:sp>
+        <p:nvSpPr>
+          <p:cNvPr id="2" name="Title 1">
+            <a:extLst>
+              <a:ext uri="{FF2B5EF4-FFF2-40B4-BE49-F238E27FC236}">
+                <a16:creationId xmlns:a16="http://schemas.microsoft.com/office/drawing/2014/main" id="{08D7BF42-6CFD-6846-9987-E6F624CEFF06}"/>
+              </a:ext>
+            </a:extLst>
+          </p:cNvPr>
+          <p:cNvSpPr>
+            <a:spLocks noGrp="1"/>
+          </p:cNvSpPr>
+          <p:nvPr>
+            <p:ph type="title"/>
+          </p:nvPr>
+        </p:nvSpPr>
+        <p:spPr>
+          <a:xfrm>
+            <a:off x="1175512" y="437322"/>
+            <a:ext cx="9792208" cy="1526968"/>
+          </a:xfrm>
+        </p:spPr>
+        <p:txBody>
+          <a:bodyPr>
+            <a:normAutofit/>
+          </a:bodyPr>
+          <a:lstStyle/>
+          <a:p>
+            <a:r>
+              <a:rPr lang="en-US" dirty="0"/>
+              <a:t>2. Setting up Git</a:t>
+            </a:r>
+          </a:p>
+        </p:txBody>
+      </p:sp>
+      <p:sp>
+        <p:nvSpPr>
+          <p:cNvPr id="4" name="Rectangle 1">
+            <a:extLst>
+              <a:ext uri="{FF2B5EF4-FFF2-40B4-BE49-F238E27FC236}">
+                <a16:creationId xmlns:a16="http://schemas.microsoft.com/office/drawing/2014/main" id="{1AC2EC41-F416-B64B-8217-A3A6377E74B8}"/>
+              </a:ext>
+            </a:extLst>
+          </p:cNvPr>
+          <p:cNvSpPr>
+            <a:spLocks noGrp="1" noChangeArrowheads="1"/>
+          </p:cNvSpPr>
+          <p:nvPr>
+            <p:ph idx="1"/>
+          </p:nvPr>
+        </p:nvSpPr>
+        <p:spPr bwMode="auto">
+          <a:xfrm>
+            <a:off x="1175512" y="2093845"/>
+            <a:ext cx="9792208" cy="4094920"/>
+          </a:xfrm>
+          <a:prstGeom prst="rect">
+            <a:avLst/>
+          </a:prstGeom>
+          <a:extLst>
+            <a:ext uri="{91240B29-F687-4F45-9708-019B960494DF}">
+              <a14:hiddenLine xmlns:a14="http://schemas.microsoft.com/office/drawing/2010/main" w="9525">
+                <a:solidFill>
+                  <a:schemeClr val="tx1"/>
+                </a:solidFill>
+                <a:miter lim="800000"/>
+                <a:headEnd/>
+                <a:tailEnd/>
+              </a14:hiddenLine>
+            </a:ext>
+            <a:ext uri="{AF507438-7753-43E0-B8FC-AC1667EBCBE1}">
+              <a14:hiddenEffects xmlns:a14="http://schemas.microsoft.com/office/drawing/2010/main">
+                <a:effectLst>
+                  <a:outerShdw dist="35921" dir="2700000" algn="ctr" rotWithShape="0">
+                    <a:schemeClr val="bg2"/>
+                  </a:outerShdw>
+                </a:effectLst>
+              </a14:hiddenEffects>
+            </a:ext>
+          </a:extLst>
+        </p:spPr>
+        <p:txBody>
+          <a:bodyPr vert="horz" lIns="0" tIns="0" rIns="0" bIns="0" numCol="1" anchorCtr="0" compatLnSpc="1">
+            <a:prstTxWarp prst="textNoShape">
+              <a:avLst/>
+            </a:prstTxWarp>
+            <a:noAutofit/>
+          </a:bodyPr>
+          <a:lstStyle>
+            <a:lvl1pPr eaLnBrk="0" fontAlgn="base" hangingPunct="0">
+              <a:spcBef>
+                <a:spcPct val="0"/>
+              </a:spcBef>
+              <a:spcAft>
+                <a:spcPct val="0"/>
+              </a:spcAft>
+              <a:tabLst>
+                <a:tab pos="581025" algn="l"/>
+                <a:tab pos="1163638" algn="l"/>
+                <a:tab pos="1744663" algn="l"/>
+                <a:tab pos="2327275" algn="l"/>
+                <a:tab pos="2908300" algn="l"/>
+                <a:tab pos="3489325" algn="l"/>
+                <a:tab pos="4071938" algn="l"/>
+                <a:tab pos="4652963" algn="l"/>
+                <a:tab pos="5235575" algn="l"/>
+                <a:tab pos="5816600" algn="l"/>
+                <a:tab pos="6397625" algn="l"/>
+                <a:tab pos="6980238" algn="l"/>
+                <a:tab pos="7561263" algn="l"/>
+                <a:tab pos="8143875" algn="l"/>
+                <a:tab pos="8724900" algn="l"/>
+                <a:tab pos="9305925" algn="l"/>
+              </a:tabLst>
+              <a:defRPr>
+                <a:solidFill>
+                  <a:schemeClr val="tx1"/>
+                </a:solidFill>
+                <a:latin typeface="Arial" panose="020B0604020202020204" pitchFamily="34" charset="0"/>
+              </a:defRPr>
+            </a:lvl1pPr>
+            <a:lvl2pPr eaLnBrk="0" fontAlgn="base" hangingPunct="0">
+              <a:spcBef>
+                <a:spcPct val="0"/>
+              </a:spcBef>
+              <a:spcAft>
+                <a:spcPct val="0"/>
+              </a:spcAft>
+              <a:tabLst>
+                <a:tab pos="581025" algn="l"/>
+                <a:tab pos="1163638" algn="l"/>
+                <a:tab pos="1744663" algn="l"/>
+                <a:tab pos="2327275" algn="l"/>
+                <a:tab pos="2908300" algn="l"/>
+                <a:tab pos="3489325" algn="l"/>
+                <a:tab pos="4071938" algn="l"/>
+                <a:tab pos="4652963" algn="l"/>
+                <a:tab pos="5235575" algn="l"/>
+                <a:tab pos="5816600" algn="l"/>
+                <a:tab pos="6397625" algn="l"/>
+                <a:tab pos="6980238" algn="l"/>
+                <a:tab pos="7561263" algn="l"/>
+                <a:tab pos="8143875" algn="l"/>
+                <a:tab pos="8724900" algn="l"/>
+                <a:tab pos="9305925" algn="l"/>
+              </a:tabLst>
+              <a:defRPr>
+                <a:solidFill>
+                  <a:schemeClr val="tx1"/>
+                </a:solidFill>
+                <a:latin typeface="Arial" panose="020B0604020202020204" pitchFamily="34" charset="0"/>
+              </a:defRPr>
+            </a:lvl2pPr>
+            <a:lvl3pPr eaLnBrk="0" fontAlgn="base" hangingPunct="0">
+              <a:spcBef>
+                <a:spcPct val="0"/>
+              </a:spcBef>
+              <a:spcAft>
+                <a:spcPct val="0"/>
+              </a:spcAft>
+              <a:tabLst>
+                <a:tab pos="581025" algn="l"/>
+                <a:tab pos="1163638" algn="l"/>
+                <a:tab pos="1744663" algn="l"/>
+                <a:tab pos="2327275" algn="l"/>
+                <a:tab pos="2908300" algn="l"/>
+                <a:tab pos="3489325" algn="l"/>
+                <a:tab pos="4071938" algn="l"/>
+                <a:tab pos="4652963" algn="l"/>
+                <a:tab pos="5235575" algn="l"/>
+                <a:tab pos="5816600" algn="l"/>
+                <a:tab pos="6397625" algn="l"/>
+                <a:tab pos="6980238" algn="l"/>
+                <a:tab pos="7561263" algn="l"/>
+                <a:tab pos="8143875" algn="l"/>
+                <a:tab pos="8724900" algn="l"/>
+                <a:tab pos="9305925" algn="l"/>
+              </a:tabLst>
+              <a:defRPr>
+                <a:solidFill>
+                  <a:schemeClr val="tx1"/>
+                </a:solidFill>
+                <a:latin typeface="Arial" panose="020B0604020202020204" pitchFamily="34" charset="0"/>
+              </a:defRPr>
+            </a:lvl3pPr>
+            <a:lvl4pPr eaLnBrk="0" fontAlgn="base" hangingPunct="0">
+              <a:spcBef>
+                <a:spcPct val="0"/>
+              </a:spcBef>
+              <a:spcAft>
+                <a:spcPct val="0"/>
+              </a:spcAft>
+              <a:tabLst>
+                <a:tab pos="581025" algn="l"/>
+                <a:tab pos="1163638" algn="l"/>
+                <a:tab pos="1744663" algn="l"/>
+                <a:tab pos="2327275" algn="l"/>
+                <a:tab pos="2908300" algn="l"/>
+                <a:tab pos="3489325" algn="l"/>
+                <a:tab pos="4071938" algn="l"/>
+                <a:tab pos="4652963" algn="l"/>
+                <a:tab pos="5235575" algn="l"/>
+                <a:tab pos="5816600" algn="l"/>
+                <a:tab pos="6397625" algn="l"/>
+                <a:tab pos="6980238" algn="l"/>
+                <a:tab pos="7561263" algn="l"/>
+                <a:tab pos="8143875" algn="l"/>
+                <a:tab pos="8724900" algn="l"/>
+                <a:tab pos="9305925" algn="l"/>
+              </a:tabLst>
+              <a:defRPr>
+                <a:solidFill>
+                  <a:schemeClr val="tx1"/>
+                </a:solidFill>
+                <a:latin typeface="Arial" panose="020B0604020202020204" pitchFamily="34" charset="0"/>
+              </a:defRPr>
+            </a:lvl4pPr>
+            <a:lvl5pPr eaLnBrk="0" fontAlgn="base" hangingPunct="0">
+              <a:spcBef>
+                <a:spcPct val="0"/>
+              </a:spcBef>
+              <a:spcAft>
+                <a:spcPct val="0"/>
+              </a:spcAft>
+              <a:tabLst>
+                <a:tab pos="581025" algn="l"/>
+                <a:tab pos="1163638" algn="l"/>
+                <a:tab pos="1744663" algn="l"/>
+                <a:tab pos="2327275" algn="l"/>
+                <a:tab pos="2908300" algn="l"/>
+                <a:tab pos="3489325" algn="l"/>
+                <a:tab pos="4071938" algn="l"/>
+                <a:tab pos="4652963" algn="l"/>
+                <a:tab pos="5235575" algn="l"/>
+                <a:tab pos="5816600" algn="l"/>
+                <a:tab pos="6397625" algn="l"/>
+                <a:tab pos="6980238" algn="l"/>
+                <a:tab pos="7561263" algn="l"/>
+                <a:tab pos="8143875" algn="l"/>
+                <a:tab pos="8724900" algn="l"/>
+                <a:tab pos="9305925" algn="l"/>
+              </a:tabLst>
+              <a:defRPr>
+                <a:solidFill>
+                  <a:schemeClr val="tx1"/>
+                </a:solidFill>
+                <a:latin typeface="Arial" panose="020B0604020202020204" pitchFamily="34" charset="0"/>
+              </a:defRPr>
+            </a:lvl5pPr>
+            <a:lvl6pPr eaLnBrk="0" fontAlgn="base" hangingPunct="0">
+              <a:spcBef>
+                <a:spcPct val="0"/>
+              </a:spcBef>
+              <a:spcAft>
+                <a:spcPct val="0"/>
+              </a:spcAft>
+              <a:tabLst>
+                <a:tab pos="581025" algn="l"/>
+                <a:tab pos="1163638" algn="l"/>
+                <a:tab pos="1744663" algn="l"/>
+                <a:tab pos="2327275" algn="l"/>
+                <a:tab pos="2908300" algn="l"/>
+                <a:tab pos="3489325" algn="l"/>
+                <a:tab pos="4071938" algn="l"/>
+                <a:tab pos="4652963" algn="l"/>
+                <a:tab pos="5235575" algn="l"/>
+                <a:tab pos="5816600" algn="l"/>
+                <a:tab pos="6397625" algn="l"/>
+                <a:tab pos="6980238" algn="l"/>
+                <a:tab pos="7561263" algn="l"/>
+                <a:tab pos="8143875" algn="l"/>
+                <a:tab pos="8724900" algn="l"/>
+                <a:tab pos="9305925" algn="l"/>
+              </a:tabLst>
+              <a:defRPr>
+                <a:solidFill>
+                  <a:schemeClr val="tx1"/>
+                </a:solidFill>
+                <a:latin typeface="Arial" panose="020B0604020202020204" pitchFamily="34" charset="0"/>
+              </a:defRPr>
+            </a:lvl6pPr>
+            <a:lvl7pPr eaLnBrk="0" fontAlgn="base" hangingPunct="0">
+              <a:spcBef>
+                <a:spcPct val="0"/>
+              </a:spcBef>
+              <a:spcAft>
+                <a:spcPct val="0"/>
+              </a:spcAft>
+              <a:tabLst>
+                <a:tab pos="581025" algn="l"/>
+                <a:tab pos="1163638" algn="l"/>
+                <a:tab pos="1744663" algn="l"/>
+                <a:tab pos="2327275" algn="l"/>
+                <a:tab pos="2908300" algn="l"/>
+                <a:tab pos="3489325" algn="l"/>
+                <a:tab pos="4071938" algn="l"/>
+                <a:tab pos="4652963" algn="l"/>
+                <a:tab pos="5235575" algn="l"/>
+                <a:tab pos="5816600" algn="l"/>
+                <a:tab pos="6397625" algn="l"/>
+                <a:tab pos="6980238" algn="l"/>
+                <a:tab pos="7561263" algn="l"/>
+                <a:tab pos="8143875" algn="l"/>
+                <a:tab pos="8724900" algn="l"/>
+                <a:tab pos="9305925" algn="l"/>
+              </a:tabLst>
+              <a:defRPr>
+                <a:solidFill>
+                  <a:schemeClr val="tx1"/>
+                </a:solidFill>
+                <a:latin typeface="Arial" panose="020B0604020202020204" pitchFamily="34" charset="0"/>
+              </a:defRPr>
+            </a:lvl7pPr>
+            <a:lvl8pPr eaLnBrk="0" fontAlgn="base" hangingPunct="0">
+              <a:spcBef>
+                <a:spcPct val="0"/>
+              </a:spcBef>
+              <a:spcAft>
+                <a:spcPct val="0"/>
+              </a:spcAft>
+              <a:tabLst>
+                <a:tab pos="581025" algn="l"/>
+                <a:tab pos="1163638" algn="l"/>
+                <a:tab pos="1744663" algn="l"/>
+                <a:tab pos="2327275" algn="l"/>
+                <a:tab pos="2908300" algn="l"/>
+                <a:tab pos="3489325" algn="l"/>
+                <a:tab pos="4071938" algn="l"/>
+                <a:tab pos="4652963" algn="l"/>
+                <a:tab pos="5235575" algn="l"/>
+                <a:tab pos="5816600" algn="l"/>
+                <a:tab pos="6397625" algn="l"/>
+                <a:tab pos="6980238" algn="l"/>
+                <a:tab pos="7561263" algn="l"/>
+                <a:tab pos="8143875" algn="l"/>
+                <a:tab pos="8724900" algn="l"/>
+                <a:tab pos="9305925" algn="l"/>
+              </a:tabLst>
+              <a:defRPr>
+                <a:solidFill>
+                  <a:schemeClr val="tx1"/>
+                </a:solidFill>
+                <a:latin typeface="Arial" panose="020B0604020202020204" pitchFamily="34" charset="0"/>
+              </a:defRPr>
+            </a:lvl8pPr>
+            <a:lvl9pPr eaLnBrk="0" fontAlgn="base" hangingPunct="0">
+              <a:spcBef>
+                <a:spcPct val="0"/>
+              </a:spcBef>
+              <a:spcAft>
+                <a:spcPct val="0"/>
+              </a:spcAft>
+              <a:tabLst>
+                <a:tab pos="581025" algn="l"/>
+                <a:tab pos="1163638" algn="l"/>
+                <a:tab pos="1744663" algn="l"/>
+                <a:tab pos="2327275" algn="l"/>
+                <a:tab pos="2908300" algn="l"/>
+                <a:tab pos="3489325" algn="l"/>
+                <a:tab pos="4071938" algn="l"/>
+                <a:tab pos="4652963" algn="l"/>
+                <a:tab pos="5235575" algn="l"/>
+                <a:tab pos="5816600" algn="l"/>
+                <a:tab pos="6397625" algn="l"/>
+                <a:tab pos="6980238" algn="l"/>
+                <a:tab pos="7561263" algn="l"/>
+                <a:tab pos="8143875" algn="l"/>
+                <a:tab pos="8724900" algn="l"/>
+                <a:tab pos="9305925" algn="l"/>
+              </a:tabLst>
+              <a:defRPr>
+                <a:solidFill>
+                  <a:schemeClr val="tx1"/>
+                </a:solidFill>
+                <a:latin typeface="Arial" panose="020B0604020202020204" pitchFamily="34" charset="0"/>
+              </a:defRPr>
+            </a:lvl9pPr>
+          </a:lstStyle>
+          <a:p>
+            <a:pPr marL="0" marR="0" lvl="0" indent="0" defTabSz="914400" rtl="0" eaLnBrk="0" fontAlgn="base" latinLnBrk="0" hangingPunct="0">
+              <a:spcBef>
+                <a:spcPct val="0"/>
+              </a:spcBef>
+              <a:spcAft>
+                <a:spcPts val="600"/>
+              </a:spcAft>
+              <a:buClrTx/>
+              <a:buSzTx/>
+              <a:buFontTx/>
+              <a:buNone/>
+              <a:tabLst>
+                <a:tab pos="581025" algn="l"/>
+                <a:tab pos="1163638" algn="l"/>
+                <a:tab pos="1744663" algn="l"/>
+                <a:tab pos="2327275" algn="l"/>
+                <a:tab pos="2908300" algn="l"/>
+                <a:tab pos="3489325" algn="l"/>
+                <a:tab pos="4071938" algn="l"/>
+                <a:tab pos="4652963" algn="l"/>
+                <a:tab pos="5235575" algn="l"/>
+                <a:tab pos="5816600" algn="l"/>
+                <a:tab pos="6397625" algn="l"/>
+                <a:tab pos="6980238" algn="l"/>
+                <a:tab pos="7561263" algn="l"/>
+                <a:tab pos="8143875" algn="l"/>
+                <a:tab pos="8724900" algn="l"/>
+                <a:tab pos="9305925" algn="l"/>
+              </a:tabLst>
+            </a:pPr>
+            <a:r>
+              <a:rPr kumimoji="0" lang="en-US" altLang="en-US" sz="2000" b="0" i="0" u="none" strike="noStrike" cap="none" normalizeH="0" baseline="0" dirty="0">
+                <a:ln>
+                  <a:noFill/>
+                </a:ln>
+                <a:effectLst/>
+                <a:latin typeface="Andale Mono" panose="020B0509000000000004" pitchFamily="49" charset="0"/>
+                <a:ea typeface="Times New Roman" panose="02020603050405020304" pitchFamily="18" charset="0"/>
+                <a:cs typeface="Courier New" panose="02070309020205020404" pitchFamily="49" charset="0"/>
+              </a:rPr>
+              <a:t>git config </a:t>
+            </a:r>
+            <a:r>
+              <a:rPr kumimoji="0" lang="en-US" altLang="en-US" sz="2000" b="1" i="0" u="none" strike="noStrike" cap="none" normalizeH="0" baseline="0" dirty="0">
+                <a:ln>
+                  <a:noFill/>
+                </a:ln>
+                <a:effectLst/>
+                <a:latin typeface="Andale Mono" panose="020B0509000000000004" pitchFamily="49" charset="0"/>
+                <a:ea typeface="Times New Roman" panose="02020603050405020304" pitchFamily="18" charset="0"/>
+              </a:rPr>
+              <a:t>--global</a:t>
+            </a:r>
+            <a:r>
+              <a:rPr kumimoji="0" lang="en-US" altLang="en-US" sz="2000" b="0" i="0" u="none" strike="noStrike" cap="none" normalizeH="0" baseline="0" dirty="0">
+                <a:ln>
+                  <a:noFill/>
+                </a:ln>
+                <a:effectLst/>
+                <a:latin typeface="Andale Mono" panose="020B0509000000000004" pitchFamily="49" charset="0"/>
+                <a:ea typeface="Times New Roman" panose="02020603050405020304" pitchFamily="18" charset="0"/>
+                <a:cs typeface="Courier New" panose="02070309020205020404" pitchFamily="49" charset="0"/>
+              </a:rPr>
+              <a:t> user.name </a:t>
+            </a:r>
+            <a:r>
+              <a:rPr kumimoji="0" lang="en-US" altLang="en-US" sz="2000" b="0" i="0" u="none" strike="noStrike" cap="none" normalizeH="0" baseline="0" dirty="0">
+                <a:ln>
+                  <a:noFill/>
+                </a:ln>
+                <a:effectLst/>
+                <a:latin typeface="Andale Mono" panose="020B0509000000000004" pitchFamily="49" charset="0"/>
+                <a:ea typeface="Times New Roman" panose="02020603050405020304" pitchFamily="18" charset="0"/>
+              </a:rPr>
+              <a:t>"Vlad Dracula"</a:t>
+            </a:r>
+          </a:p>
+          <a:p>
+            <a:pPr marL="0" marR="0" lvl="0" indent="0" defTabSz="914400" rtl="0" eaLnBrk="0" fontAlgn="base" latinLnBrk="0" hangingPunct="0">
+              <a:spcBef>
+                <a:spcPct val="0"/>
+              </a:spcBef>
+              <a:spcAft>
+                <a:spcPts val="600"/>
+              </a:spcAft>
+              <a:buClrTx/>
+              <a:buSzTx/>
+              <a:buFontTx/>
+              <a:buNone/>
+              <a:tabLst>
+                <a:tab pos="581025" algn="l"/>
+                <a:tab pos="1163638" algn="l"/>
+                <a:tab pos="1744663" algn="l"/>
+                <a:tab pos="2327275" algn="l"/>
+                <a:tab pos="2908300" algn="l"/>
+                <a:tab pos="3489325" algn="l"/>
+                <a:tab pos="4071938" algn="l"/>
+                <a:tab pos="4652963" algn="l"/>
+                <a:tab pos="5235575" algn="l"/>
+                <a:tab pos="5816600" algn="l"/>
+                <a:tab pos="6397625" algn="l"/>
+                <a:tab pos="6980238" algn="l"/>
+                <a:tab pos="7561263" algn="l"/>
+                <a:tab pos="8143875" algn="l"/>
+                <a:tab pos="8724900" algn="l"/>
+                <a:tab pos="9305925" algn="l"/>
+              </a:tabLst>
+            </a:pPr>
+            <a:r>
+              <a:rPr kumimoji="0" lang="en-US" altLang="en-US" sz="2000" b="0" i="0" u="none" strike="noStrike" cap="none" normalizeH="0" baseline="0" dirty="0">
+                <a:ln>
+                  <a:noFill/>
+                </a:ln>
+                <a:effectLst/>
+                <a:latin typeface="Andale Mono" panose="020B0509000000000004" pitchFamily="49" charset="0"/>
+                <a:ea typeface="Times New Roman" panose="02020603050405020304" pitchFamily="18" charset="0"/>
+                <a:cs typeface="Courier New" panose="02070309020205020404" pitchFamily="49" charset="0"/>
+              </a:rPr>
+              <a:t>git config </a:t>
+            </a:r>
+            <a:r>
+              <a:rPr kumimoji="0" lang="en-US" altLang="en-US" sz="2000" b="1" i="0" u="none" strike="noStrike" cap="none" normalizeH="0" baseline="0" dirty="0">
+                <a:ln>
+                  <a:noFill/>
+                </a:ln>
+                <a:effectLst/>
+                <a:latin typeface="Andale Mono" panose="020B0509000000000004" pitchFamily="49" charset="0"/>
+                <a:ea typeface="Times New Roman" panose="02020603050405020304" pitchFamily="18" charset="0"/>
+              </a:rPr>
+              <a:t>--global</a:t>
+            </a:r>
+            <a:r>
+              <a:rPr kumimoji="0" lang="en-US" altLang="en-US" sz="2000" b="0" i="0" u="none" strike="noStrike" cap="none" normalizeH="0" baseline="0" dirty="0">
+                <a:ln>
+                  <a:noFill/>
+                </a:ln>
+                <a:effectLst/>
+                <a:latin typeface="Andale Mono" panose="020B0509000000000004" pitchFamily="49" charset="0"/>
+                <a:ea typeface="Times New Roman" panose="02020603050405020304" pitchFamily="18" charset="0"/>
+                <a:cs typeface="Courier New" panose="02070309020205020404" pitchFamily="49" charset="0"/>
+              </a:rPr>
+              <a:t> user.email </a:t>
+            </a:r>
+            <a:r>
+              <a:rPr kumimoji="0" lang="en-US" altLang="en-US" sz="2000" b="0" i="0" u="none" strike="noStrike" cap="none" normalizeH="0" baseline="0" dirty="0">
+                <a:ln>
+                  <a:noFill/>
+                </a:ln>
+                <a:effectLst/>
+                <a:latin typeface="Andale Mono" panose="020B0509000000000004" pitchFamily="49" charset="0"/>
+                <a:ea typeface="Times New Roman" panose="02020603050405020304" pitchFamily="18" charset="0"/>
+                <a:hlinkClick r:id="rId2"/>
+              </a:rPr>
+              <a:t>vlad@tran.sylvan.ia</a:t>
+            </a:r>
+            <a:endParaRPr kumimoji="0" lang="en-US" altLang="en-US" sz="2000" b="0" i="0" u="none" strike="noStrike" cap="none" normalizeH="0" baseline="0" dirty="0">
+              <a:ln>
+                <a:noFill/>
+              </a:ln>
+              <a:effectLst/>
+              <a:latin typeface="Andale Mono" panose="020B0509000000000004" pitchFamily="49" charset="0"/>
+              <a:ea typeface="Times New Roman" panose="02020603050405020304" pitchFamily="18" charset="0"/>
+            </a:endParaRPr>
+          </a:p>
+          <a:p>
+            <a:pPr marL="0" marR="0" lvl="0" indent="0" defTabSz="914400" rtl="0" eaLnBrk="0" fontAlgn="base" latinLnBrk="0" hangingPunct="0">
+              <a:spcBef>
+                <a:spcPct val="0"/>
+              </a:spcBef>
+              <a:spcAft>
+                <a:spcPts val="600"/>
+              </a:spcAft>
+              <a:buClrTx/>
+              <a:buSzTx/>
+              <a:buFontTx/>
+              <a:buNone/>
+              <a:tabLst>
+                <a:tab pos="581025" algn="l"/>
+                <a:tab pos="1163638" algn="l"/>
+                <a:tab pos="1744663" algn="l"/>
+                <a:tab pos="2327275" algn="l"/>
+                <a:tab pos="2908300" algn="l"/>
+                <a:tab pos="3489325" algn="l"/>
+                <a:tab pos="4071938" algn="l"/>
+                <a:tab pos="4652963" algn="l"/>
+                <a:tab pos="5235575" algn="l"/>
+                <a:tab pos="5816600" algn="l"/>
+                <a:tab pos="6397625" algn="l"/>
+                <a:tab pos="6980238" algn="l"/>
+                <a:tab pos="7561263" algn="l"/>
+                <a:tab pos="8143875" algn="l"/>
+                <a:tab pos="8724900" algn="l"/>
+                <a:tab pos="9305925" algn="l"/>
+              </a:tabLst>
+            </a:pPr>
+            <a:r>
+              <a:rPr kumimoji="0" lang="en-US" altLang="en-US" sz="2000" b="0" i="0" u="none" strike="noStrike" cap="none" normalizeH="0" baseline="0" dirty="0">
+                <a:ln>
+                  <a:noFill/>
+                </a:ln>
+                <a:effectLst/>
+                <a:latin typeface="Andale Mono" panose="020B0509000000000004" pitchFamily="49" charset="0"/>
+              </a:rPr>
+              <a:t> </a:t>
+            </a:r>
+          </a:p>
+          <a:p>
+            <a:pPr marL="0" marR="0" lvl="0" indent="0" defTabSz="914400" rtl="0" eaLnBrk="0" fontAlgn="base" latinLnBrk="0" hangingPunct="0">
+              <a:spcBef>
+                <a:spcPct val="0"/>
+              </a:spcBef>
+              <a:spcAft>
+                <a:spcPts val="600"/>
+              </a:spcAft>
+              <a:buClrTx/>
+              <a:buSzTx/>
+              <a:buFontTx/>
+              <a:buNone/>
+              <a:tabLst>
+                <a:tab pos="581025" algn="l"/>
+                <a:tab pos="1163638" algn="l"/>
+                <a:tab pos="1744663" algn="l"/>
+                <a:tab pos="2327275" algn="l"/>
+                <a:tab pos="2908300" algn="l"/>
+                <a:tab pos="3489325" algn="l"/>
+                <a:tab pos="4071938" algn="l"/>
+                <a:tab pos="4652963" algn="l"/>
+                <a:tab pos="5235575" algn="l"/>
+                <a:tab pos="5816600" algn="l"/>
+                <a:tab pos="6397625" algn="l"/>
+                <a:tab pos="6980238" algn="l"/>
+                <a:tab pos="7561263" algn="l"/>
+                <a:tab pos="8143875" algn="l"/>
+                <a:tab pos="8724900" algn="l"/>
+                <a:tab pos="9305925" algn="l"/>
+              </a:tabLst>
+            </a:pPr>
+            <a:r>
+              <a:rPr kumimoji="0" lang="en-US" altLang="en-US" sz="2000" b="0" i="0" u="none" strike="noStrike" cap="none" normalizeH="0" baseline="0" dirty="0">
+                <a:ln>
+                  <a:noFill/>
+                </a:ln>
+                <a:effectLst/>
+                <a:latin typeface="Andale Mono" panose="020B0509000000000004" pitchFamily="49" charset="0"/>
+                <a:ea typeface="Calibri" panose="020F0502020204030204" pitchFamily="34" charset="0"/>
+                <a:cs typeface="Times New Roman" panose="02020603050405020304" pitchFamily="18" charset="0"/>
+              </a:rPr>
+              <a:t>Mac and Linux users:</a:t>
+            </a:r>
+            <a:endParaRPr kumimoji="0" lang="en-US" altLang="en-US" sz="2000" b="0" i="0" u="none" strike="noStrike" cap="none" normalizeH="0" baseline="0" dirty="0">
+              <a:ln>
+                <a:noFill/>
+              </a:ln>
+              <a:effectLst/>
+              <a:latin typeface="Andale Mono" panose="020B0509000000000004" pitchFamily="49" charset="0"/>
+            </a:endParaRPr>
+          </a:p>
+          <a:p>
+            <a:pPr marL="0" marR="0" lvl="0" indent="0" defTabSz="914400" rtl="0" eaLnBrk="0" fontAlgn="base" latinLnBrk="0" hangingPunct="0">
+              <a:spcBef>
+                <a:spcPct val="0"/>
+              </a:spcBef>
+              <a:spcAft>
+                <a:spcPts val="600"/>
+              </a:spcAft>
+              <a:buClrTx/>
+              <a:buSzTx/>
+              <a:buFontTx/>
+              <a:buNone/>
+              <a:tabLst>
+                <a:tab pos="581025" algn="l"/>
+                <a:tab pos="1163638" algn="l"/>
+                <a:tab pos="1744663" algn="l"/>
+                <a:tab pos="2327275" algn="l"/>
+                <a:tab pos="2908300" algn="l"/>
+                <a:tab pos="3489325" algn="l"/>
+                <a:tab pos="4071938" algn="l"/>
+                <a:tab pos="4652963" algn="l"/>
+                <a:tab pos="5235575" algn="l"/>
+                <a:tab pos="5816600" algn="l"/>
+                <a:tab pos="6397625" algn="l"/>
+                <a:tab pos="6980238" algn="l"/>
+                <a:tab pos="7561263" algn="l"/>
+                <a:tab pos="8143875" algn="l"/>
+                <a:tab pos="8724900" algn="l"/>
+                <a:tab pos="9305925" algn="l"/>
+              </a:tabLst>
+            </a:pPr>
+            <a:r>
+              <a:rPr kumimoji="0" lang="en-US" altLang="en-US" sz="2000" b="0" i="0" u="none" strike="noStrike" cap="none" normalizeH="0" baseline="0" dirty="0">
+                <a:ln>
+                  <a:noFill/>
+                </a:ln>
+                <a:effectLst/>
+                <a:latin typeface="Andale Mono" panose="020B0509000000000004" pitchFamily="49" charset="0"/>
+                <a:ea typeface="Times New Roman" panose="02020603050405020304" pitchFamily="18" charset="0"/>
+                <a:cs typeface="Times New Roman" panose="02020603050405020304" pitchFamily="18" charset="0"/>
+              </a:rPr>
+              <a:t>git config </a:t>
+            </a:r>
+            <a:r>
+              <a:rPr kumimoji="0" lang="en-US" altLang="en-US" sz="2000" b="1" i="0" u="none" strike="noStrike" cap="none" normalizeH="0" baseline="0" dirty="0">
+                <a:ln>
+                  <a:noFill/>
+                </a:ln>
+                <a:effectLst/>
+                <a:latin typeface="Andale Mono" panose="020B0509000000000004" pitchFamily="49" charset="0"/>
+                <a:ea typeface="Times New Roman" panose="02020603050405020304" pitchFamily="18" charset="0"/>
+                <a:cs typeface="Times New Roman" panose="02020603050405020304" pitchFamily="18" charset="0"/>
+              </a:rPr>
+              <a:t>--global</a:t>
+            </a:r>
+            <a:r>
+              <a:rPr kumimoji="0" lang="en-US" altLang="en-US" sz="2000" b="0" i="0" u="none" strike="noStrike" cap="none" normalizeH="0" baseline="0" dirty="0">
+                <a:ln>
+                  <a:noFill/>
+                </a:ln>
+                <a:effectLst/>
+                <a:latin typeface="Andale Mono" panose="020B0509000000000004" pitchFamily="49" charset="0"/>
+                <a:ea typeface="Times New Roman" panose="02020603050405020304" pitchFamily="18" charset="0"/>
+                <a:cs typeface="Times New Roman" panose="02020603050405020304" pitchFamily="18" charset="0"/>
+              </a:rPr>
+              <a:t> core.autocrlf input</a:t>
+            </a:r>
+            <a:endParaRPr kumimoji="0" lang="en-US" altLang="en-US" sz="2000" b="0" i="0" u="none" strike="noStrike" cap="none" normalizeH="0" baseline="0" dirty="0">
+              <a:ln>
+                <a:noFill/>
+              </a:ln>
+              <a:effectLst/>
+              <a:latin typeface="Andale Mono" panose="020B0509000000000004" pitchFamily="49" charset="0"/>
+            </a:endParaRPr>
+          </a:p>
+          <a:p>
+            <a:pPr marL="0" marR="0" lvl="0" indent="0" defTabSz="914400" rtl="0" eaLnBrk="0" fontAlgn="base" latinLnBrk="0" hangingPunct="0">
+              <a:spcBef>
+                <a:spcPct val="0"/>
+              </a:spcBef>
+              <a:spcAft>
+                <a:spcPts val="600"/>
+              </a:spcAft>
+              <a:buClrTx/>
+              <a:buSzTx/>
+              <a:buFontTx/>
+              <a:buNone/>
+              <a:tabLst>
+                <a:tab pos="581025" algn="l"/>
+                <a:tab pos="1163638" algn="l"/>
+                <a:tab pos="1744663" algn="l"/>
+                <a:tab pos="2327275" algn="l"/>
+                <a:tab pos="2908300" algn="l"/>
+                <a:tab pos="3489325" algn="l"/>
+                <a:tab pos="4071938" algn="l"/>
+                <a:tab pos="4652963" algn="l"/>
+                <a:tab pos="5235575" algn="l"/>
+                <a:tab pos="5816600" algn="l"/>
+                <a:tab pos="6397625" algn="l"/>
+                <a:tab pos="6980238" algn="l"/>
+                <a:tab pos="7561263" algn="l"/>
+                <a:tab pos="8143875" algn="l"/>
+                <a:tab pos="8724900" algn="l"/>
+                <a:tab pos="9305925" algn="l"/>
+              </a:tabLst>
+            </a:pPr>
+            <a:r>
+              <a:rPr kumimoji="0" lang="en-US" altLang="en-US" sz="2000" b="0" i="0" u="none" strike="noStrike" cap="none" normalizeH="0" baseline="0" dirty="0">
+                <a:ln>
+                  <a:noFill/>
+                </a:ln>
+                <a:effectLst/>
+                <a:latin typeface="Andale Mono" panose="020B0509000000000004" pitchFamily="49" charset="0"/>
+                <a:ea typeface="Calibri" panose="020F0502020204030204" pitchFamily="34" charset="0"/>
+                <a:cs typeface="Times New Roman" panose="02020603050405020304" pitchFamily="18" charset="0"/>
+              </a:rPr>
+              <a:t>Windows users:</a:t>
+            </a:r>
+            <a:endParaRPr kumimoji="0" lang="en-US" altLang="en-US" sz="2000" b="0" i="0" u="none" strike="noStrike" cap="none" normalizeH="0" baseline="0" dirty="0">
+              <a:ln>
+                <a:noFill/>
+              </a:ln>
+              <a:effectLst/>
+              <a:latin typeface="Andale Mono" panose="020B0509000000000004" pitchFamily="49" charset="0"/>
+              <a:ea typeface="Times New Roman" panose="02020603050405020304" pitchFamily="18" charset="0"/>
+              <a:cs typeface="Courier New" panose="02070309020205020404" pitchFamily="49" charset="0"/>
+            </a:endParaRPr>
+          </a:p>
+          <a:p>
+            <a:pPr marL="0" marR="0" lvl="0" indent="0" defTabSz="914400" rtl="0" eaLnBrk="0" fontAlgn="base" latinLnBrk="0" hangingPunct="0">
+              <a:spcBef>
+                <a:spcPct val="0"/>
+              </a:spcBef>
+              <a:spcAft>
+                <a:spcPts val="600"/>
+              </a:spcAft>
+              <a:buClrTx/>
+              <a:buSzTx/>
+              <a:buFontTx/>
+              <a:buNone/>
+              <a:tabLst>
+                <a:tab pos="581025" algn="l"/>
+                <a:tab pos="1163638" algn="l"/>
+                <a:tab pos="1744663" algn="l"/>
+                <a:tab pos="2327275" algn="l"/>
+                <a:tab pos="2908300" algn="l"/>
+                <a:tab pos="3489325" algn="l"/>
+                <a:tab pos="4071938" algn="l"/>
+                <a:tab pos="4652963" algn="l"/>
+                <a:tab pos="5235575" algn="l"/>
+                <a:tab pos="5816600" algn="l"/>
+                <a:tab pos="6397625" algn="l"/>
+                <a:tab pos="6980238" algn="l"/>
+                <a:tab pos="7561263" algn="l"/>
+                <a:tab pos="8143875" algn="l"/>
+                <a:tab pos="8724900" algn="l"/>
+                <a:tab pos="9305925" algn="l"/>
+              </a:tabLst>
+            </a:pPr>
+            <a:r>
+              <a:rPr kumimoji="0" lang="en-US" altLang="en-US" sz="2000" b="0" i="0" u="none" strike="noStrike" cap="none" normalizeH="0" baseline="0" dirty="0">
+                <a:ln>
+                  <a:noFill/>
+                </a:ln>
+                <a:effectLst/>
+                <a:latin typeface="Andale Mono" panose="020B0509000000000004" pitchFamily="49" charset="0"/>
+                <a:ea typeface="Times New Roman" panose="02020603050405020304" pitchFamily="18" charset="0"/>
+                <a:cs typeface="Courier New" panose="02070309020205020404" pitchFamily="49" charset="0"/>
+              </a:rPr>
+              <a:t>git config </a:t>
+            </a:r>
+            <a:r>
+              <a:rPr kumimoji="0" lang="en-US" altLang="en-US" sz="2000" b="1" i="0" u="none" strike="noStrike" cap="none" normalizeH="0" baseline="0" dirty="0">
+                <a:ln>
+                  <a:noFill/>
+                </a:ln>
+                <a:effectLst/>
+                <a:latin typeface="Andale Mono" panose="020B0509000000000004" pitchFamily="49" charset="0"/>
+                <a:ea typeface="Times New Roman" panose="02020603050405020304" pitchFamily="18" charset="0"/>
+              </a:rPr>
+              <a:t>--global</a:t>
+            </a:r>
+            <a:r>
+              <a:rPr kumimoji="0" lang="en-US" altLang="en-US" sz="2000" b="0" i="0" u="none" strike="noStrike" cap="none" normalizeH="0" baseline="0" dirty="0">
+                <a:ln>
+                  <a:noFill/>
+                </a:ln>
+                <a:effectLst/>
+                <a:latin typeface="Andale Mono" panose="020B0509000000000004" pitchFamily="49" charset="0"/>
+                <a:ea typeface="Times New Roman" panose="02020603050405020304" pitchFamily="18" charset="0"/>
+                <a:cs typeface="Courier New" panose="02070309020205020404" pitchFamily="49" charset="0"/>
+              </a:rPr>
+              <a:t> core.autocrlf </a:t>
+            </a:r>
+            <a:endParaRPr kumimoji="0" lang="en-US" altLang="en-US" sz="2000" b="0" i="0" u="none" strike="noStrike" cap="none" normalizeH="0" baseline="0" dirty="0">
+              <a:ln>
+                <a:noFill/>
+              </a:ln>
+              <a:effectLst/>
+              <a:latin typeface="Andale Mono" panose="020B0509000000000004" pitchFamily="49" charset="0"/>
+            </a:endParaRPr>
+          </a:p>
+          <a:p>
+            <a:pPr marL="0" marR="0" lvl="0" indent="0" defTabSz="914400" rtl="0" eaLnBrk="0" fontAlgn="base" latinLnBrk="0" hangingPunct="0">
+              <a:spcBef>
+                <a:spcPct val="0"/>
+              </a:spcBef>
+              <a:spcAft>
+                <a:spcPts val="600"/>
+              </a:spcAft>
+              <a:buClrTx/>
+              <a:buSzTx/>
+              <a:buFontTx/>
+              <a:buNone/>
+              <a:tabLst>
+                <a:tab pos="581025" algn="l"/>
+                <a:tab pos="1163638" algn="l"/>
+                <a:tab pos="1744663" algn="l"/>
+                <a:tab pos="2327275" algn="l"/>
+                <a:tab pos="2908300" algn="l"/>
+                <a:tab pos="3489325" algn="l"/>
+                <a:tab pos="4071938" algn="l"/>
+                <a:tab pos="4652963" algn="l"/>
+                <a:tab pos="5235575" algn="l"/>
+                <a:tab pos="5816600" algn="l"/>
+                <a:tab pos="6397625" algn="l"/>
+                <a:tab pos="6980238" algn="l"/>
+                <a:tab pos="7561263" algn="l"/>
+                <a:tab pos="8143875" algn="l"/>
+                <a:tab pos="8724900" algn="l"/>
+                <a:tab pos="9305925" algn="l"/>
+              </a:tabLst>
+            </a:pPr>
+            <a:r>
+              <a:rPr kumimoji="0" lang="en-US" altLang="en-US" sz="2000" b="0" i="0" u="none" strike="noStrike" cap="none" normalizeH="0" baseline="0" dirty="0">
+                <a:ln>
+                  <a:noFill/>
+                </a:ln>
+                <a:effectLst/>
+                <a:latin typeface="Andale Mono" panose="020B0509000000000004" pitchFamily="49" charset="0"/>
+              </a:rPr>
+              <a:t> </a:t>
+            </a:r>
+          </a:p>
+          <a:p>
+            <a:pPr marL="0" marR="0" lvl="0" indent="0" defTabSz="914400" rtl="0" eaLnBrk="0" fontAlgn="base" latinLnBrk="0" hangingPunct="0">
+              <a:spcBef>
+                <a:spcPct val="0"/>
+              </a:spcBef>
+              <a:spcAft>
+                <a:spcPts val="600"/>
+              </a:spcAft>
+              <a:buClrTx/>
+              <a:buSzTx/>
+              <a:buFontTx/>
+              <a:buNone/>
+              <a:tabLst>
+                <a:tab pos="581025" algn="l"/>
+                <a:tab pos="1163638" algn="l"/>
+                <a:tab pos="1744663" algn="l"/>
+                <a:tab pos="2327275" algn="l"/>
+                <a:tab pos="2908300" algn="l"/>
+                <a:tab pos="3489325" algn="l"/>
+                <a:tab pos="4071938" algn="l"/>
+                <a:tab pos="4652963" algn="l"/>
+                <a:tab pos="5235575" algn="l"/>
+                <a:tab pos="5816600" algn="l"/>
+                <a:tab pos="6397625" algn="l"/>
+                <a:tab pos="6980238" algn="l"/>
+                <a:tab pos="7561263" algn="l"/>
+                <a:tab pos="8143875" algn="l"/>
+                <a:tab pos="8724900" algn="l"/>
+                <a:tab pos="9305925" algn="l"/>
+              </a:tabLst>
+            </a:pPr>
+            <a:r>
+              <a:rPr kumimoji="0" lang="en-US" altLang="en-US" sz="2000" b="0" i="0" u="none" strike="noStrike" cap="none" normalizeH="0" baseline="0" dirty="0">
+                <a:ln>
+                  <a:noFill/>
+                </a:ln>
+                <a:effectLst/>
+                <a:latin typeface="Andale Mono" panose="020B0509000000000004" pitchFamily="49" charset="0"/>
+                <a:ea typeface="Times New Roman" panose="02020603050405020304" pitchFamily="18" charset="0"/>
+              </a:rPr>
+              <a:t>git config --global core.editor "nano -w"</a:t>
+            </a:r>
+          </a:p>
+          <a:p>
+            <a:pPr marL="0" lvl="0" indent="0">
+              <a:spcAft>
+                <a:spcPts val="600"/>
+              </a:spcAft>
+              <a:buClrTx/>
+              <a:buNone/>
+            </a:pPr>
+            <a:r>
+              <a:rPr lang="en-US" altLang="en-US" sz="1600" dirty="0">
+                <a:latin typeface="+mn-lt"/>
+              </a:rPr>
+              <a:t>(Full list of text editors: </a:t>
+            </a:r>
+            <a:r>
+              <a:rPr lang="en-US" sz="1600" dirty="0">
+                <a:latin typeface="+mn-lt"/>
+                <a:hlinkClick r:id="rId3"/>
+              </a:rPr>
+              <a:t>https://git-scm.com/book/en/v2/Appendix-C%3A-Git-Commands-Setup-and-Config</a:t>
+            </a:r>
+            <a:r>
+              <a:rPr lang="en-US" sz="1600" dirty="0">
+                <a:latin typeface="+mn-lt"/>
+              </a:rPr>
+              <a:t>)</a:t>
+            </a:r>
+            <a:r>
+              <a:rPr kumimoji="0" lang="en-US" altLang="en-US" sz="1600" b="0" i="0" u="none" strike="noStrike" cap="none" normalizeH="0" baseline="0" dirty="0">
+                <a:ln>
+                  <a:noFill/>
+                </a:ln>
+                <a:effectLst/>
+                <a:latin typeface="+mn-lt"/>
+              </a:rPr>
+              <a:t> </a:t>
+            </a:r>
+          </a:p>
+        </p:txBody>
+      </p:sp>
+    </p:spTree>
+    <p:extLst>
+      <p:ext uri="{BB962C8B-B14F-4D97-AF65-F5344CB8AC3E}">
+        <p14:creationId xmlns:p14="http://schemas.microsoft.com/office/powerpoint/2010/main" val="3769223895"/>
+      </p:ext>
+    </p:extLst>
+  </p:cSld>
+  <p:clrMapOvr>
+    <a:masterClrMapping/>
+  </p:clrMapOvr>
+</p:sld>
+</file>
+
 <file path=ppt/slides/slide4.xml><?xml version="1.0" encoding="utf-8"?>
 <p:sld xmlns:a="http://schemas.openxmlformats.org/drawingml/2006/main" xmlns:r="http://schemas.openxmlformats.org/officeDocument/2006/relationships" xmlns:p="http://schemas.openxmlformats.org/presentationml/2006/main">
   <p:cSld>

</xml_diff>